<commit_message>
Update conf.py to match doctor JIRA:COPPER-1
Change-Id: Ic006eb2780be671b96545865950b831cffbed86d

Signed-off-by: blsaws <bs3131@att.com>
</commit_message>
<xml_diff>
--- a/design_docs/images/policy_architecture.pptx
+++ b/design_docs/images/policy_architecture.pptx
@@ -208,7 +208,7 @@
           <a:p>
             <a:fld id="{CBF909A2-FA5B-469B-B268-8913338CE6C4}" type="datetimeFigureOut">
               <a:rPr lang="en-US" smtClean="0"/>
-              <a:t>5/11/2015</a:t>
+              <a:t>7/31/2015</a:t>
             </a:fld>
             <a:endParaRPr lang="en-US"/>
           </a:p>
@@ -1625,14 +1625,14 @@
       </p:sp>
       <p:sp>
         <p:nvSpPr>
-          <p:cNvPr id="28" name="Rounded Rectangle 27"/>
+          <p:cNvPr id="29" name="Rounded Rectangle 28"/>
           <p:cNvSpPr/>
           <p:nvPr/>
         </p:nvSpPr>
         <p:spPr>
           <a:xfrm>
-            <a:off x="838200" y="5537214"/>
-            <a:ext cx="1905001" cy="863586"/>
+            <a:off x="609400" y="5062091"/>
+            <a:ext cx="1891030" cy="812096"/>
           </a:xfrm>
           <a:prstGeom prst="roundRect">
             <a:avLst/>
@@ -1659,7 +1659,7 @@
             <a:pPr algn="ctr"/>
             <a:r>
               <a:rPr lang="en-US" dirty="0" smtClean="0"/>
-              <a:t>Nodal Controller</a:t>
+              <a:t>Local Controller</a:t>
             </a:r>
           </a:p>
           <a:p>
@@ -1679,7 +1679,6 @@
               <a:rPr lang="en-US" sz="1200" dirty="0" smtClean="0"/>
               <a:t>enforcement</a:t>
             </a:r>
-            <a:endParaRPr lang="en-US" sz="1200" dirty="0"/>
           </a:p>
           <a:p>
             <a:pPr marL="113607" indent="-113607">
@@ -1687,131 +1686,24 @@
               <a:buChar char="•"/>
             </a:pPr>
             <a:r>
-              <a:rPr lang="en-US" sz="1200" dirty="0"/>
-              <a:t>Closed-loop policy events</a:t>
-            </a:r>
-            <a:endParaRPr lang="en-US" sz="1200" dirty="0" smtClean="0"/>
-          </a:p>
-        </p:txBody>
-      </p:sp>
-      <p:sp>
-        <p:nvSpPr>
-          <p:cNvPr id="29" name="Rounded Rectangle 28"/>
-          <p:cNvSpPr/>
-          <p:nvPr/>
-        </p:nvSpPr>
-        <p:spPr>
-          <a:xfrm>
-            <a:off x="76200" y="4597428"/>
-            <a:ext cx="1891030" cy="812096"/>
-          </a:xfrm>
-          <a:prstGeom prst="roundRect">
-            <a:avLst/>
-          </a:prstGeom>
-        </p:spPr>
-        <p:style>
-          <a:lnRef idx="1">
-            <a:schemeClr val="accent3"/>
-          </a:lnRef>
-          <a:fillRef idx="3">
-            <a:schemeClr val="accent3"/>
-          </a:fillRef>
-          <a:effectRef idx="2">
-            <a:schemeClr val="accent3"/>
-          </a:effectRef>
-          <a:fontRef idx="minor">
-            <a:schemeClr val="lt1"/>
-          </a:fontRef>
-        </p:style>
-        <p:txBody>
-          <a:bodyPr lIns="45390" tIns="45390" rIns="45390" bIns="45390" rtlCol="0" anchor="ctr"/>
-          <a:lstStyle/>
-          <a:p>
-            <a:pPr algn="ctr"/>
-            <a:r>
-              <a:rPr lang="en-US" dirty="0" smtClean="0"/>
-              <a:t>Local Controller</a:t>
-            </a:r>
-          </a:p>
-          <a:p>
-            <a:pPr marL="113607" indent="-113607">
-              <a:buFont typeface="Arial" panose="020B0604020202020204" pitchFamily="34" charset="0"/>
-              <a:buChar char="•"/>
-            </a:pPr>
-            <a:r>
-              <a:rPr lang="en-US" sz="1200" dirty="0" smtClean="0"/>
-              <a:t>Local </a:t>
-            </a:r>
-            <a:r>
-              <a:rPr lang="en-US" sz="1200" dirty="0"/>
-              <a:t>policy </a:t>
-            </a:r>
-            <a:r>
-              <a:rPr lang="en-US" sz="1200" dirty="0" smtClean="0"/>
-              <a:t>enforcement</a:t>
-            </a:r>
-          </a:p>
-          <a:p>
-            <a:pPr marL="113607" indent="-113607">
-              <a:buFont typeface="Arial" panose="020B0604020202020204" pitchFamily="34" charset="0"/>
-              <a:buChar char="•"/>
-            </a:pPr>
-            <a:r>
               <a:rPr lang="en-US" sz="1200" dirty="0" smtClean="0"/>
               <a:t>Closed-loop policy events</a:t>
             </a:r>
           </a:p>
         </p:txBody>
       </p:sp>
-      <p:cxnSp>
-        <p:nvCxnSpPr>
-          <p:cNvPr id="8" name="Straight Arrow Connector 7"/>
-          <p:cNvCxnSpPr/>
-          <p:nvPr/>
-        </p:nvCxnSpPr>
-        <p:spPr>
-          <a:xfrm flipH="1" flipV="1">
-            <a:off x="2711020" y="5892806"/>
-            <a:ext cx="776118" cy="1"/>
-          </a:xfrm>
-          <a:prstGeom prst="straightConnector1">
-            <a:avLst/>
-          </a:prstGeom>
-          <a:ln w="34925">
-            <a:solidFill>
-              <a:schemeClr val="tx1">
-                <a:lumMod val="50000"/>
-                <a:lumOff val="50000"/>
-              </a:schemeClr>
-            </a:solidFill>
-            <a:tailEnd type="triangle"/>
-          </a:ln>
-        </p:spPr>
-        <p:style>
-          <a:lnRef idx="1">
-            <a:schemeClr val="accent1"/>
-          </a:lnRef>
-          <a:fillRef idx="0">
-            <a:schemeClr val="accent1"/>
-          </a:fillRef>
-          <a:effectRef idx="0">
-            <a:schemeClr val="accent1"/>
-          </a:effectRef>
-          <a:fontRef idx="minor">
-            <a:schemeClr val="tx1"/>
-          </a:fontRef>
-        </p:style>
-      </p:cxnSp>
       <p:cxnSp>
         <p:nvCxnSpPr>
           <p:cNvPr id="34" name="Straight Arrow Connector 33"/>
-          <p:cNvCxnSpPr/>
+          <p:cNvCxnSpPr>
+            <a:endCxn id="29" idx="0"/>
+          </p:cNvCxnSpPr>
           <p:nvPr/>
         </p:nvCxnSpPr>
         <p:spPr>
           <a:xfrm>
-            <a:off x="1673440" y="3957729"/>
-            <a:ext cx="2960" cy="624639"/>
+            <a:off x="1554915" y="4008733"/>
+            <a:ext cx="0" cy="1053358"/>
           </a:xfrm>
           <a:prstGeom prst="straightConnector1">
             <a:avLst/>
@@ -1852,46 +1744,6 @@
           <a:xfrm>
             <a:off x="3540340" y="4008733"/>
             <a:ext cx="359542" cy="832304"/>
-          </a:xfrm>
-          <a:prstGeom prst="straightConnector1">
-            <a:avLst/>
-          </a:prstGeom>
-          <a:ln w="34925">
-            <a:solidFill>
-              <a:schemeClr val="tx1">
-                <a:lumMod val="50000"/>
-                <a:lumOff val="50000"/>
-              </a:schemeClr>
-            </a:solidFill>
-            <a:headEnd type="triangle"/>
-            <a:tailEnd type="triangle"/>
-          </a:ln>
-        </p:spPr>
-        <p:style>
-          <a:lnRef idx="1">
-            <a:schemeClr val="accent1"/>
-          </a:lnRef>
-          <a:fillRef idx="0">
-            <a:schemeClr val="accent1"/>
-          </a:fillRef>
-          <a:effectRef idx="0">
-            <a:schemeClr val="accent1"/>
-          </a:effectRef>
-          <a:fontRef idx="minor">
-            <a:schemeClr val="tx1"/>
-          </a:fontRef>
-        </p:style>
-      </p:cxnSp>
-      <p:cxnSp>
-        <p:nvCxnSpPr>
-          <p:cNvPr id="36" name="Straight Arrow Connector 35"/>
-          <p:cNvCxnSpPr/>
-          <p:nvPr/>
-        </p:nvCxnSpPr>
-        <p:spPr>
-          <a:xfrm>
-            <a:off x="2403936" y="3957729"/>
-            <a:ext cx="7830" cy="1553030"/>
           </a:xfrm>
           <a:prstGeom prst="straightConnector1">
             <a:avLst/>
@@ -2013,7 +1865,7 @@
         </p:nvSpPr>
         <p:spPr>
           <a:xfrm>
-            <a:off x="2762408" y="5409524"/>
+            <a:off x="2692271" y="4999349"/>
             <a:ext cx="782222" cy="461665"/>
           </a:xfrm>
           <a:prstGeom prst="rect">
@@ -2046,9 +1898,9 @@
           <p:nvPr/>
         </p:nvCxnSpPr>
         <p:spPr>
-          <a:xfrm flipH="1">
-            <a:off x="1967230" y="5115510"/>
-            <a:ext cx="1549600" cy="6744"/>
+          <a:xfrm flipH="1" flipV="1">
+            <a:off x="2502060" y="5461014"/>
+            <a:ext cx="1028740" cy="7125"/>
           </a:xfrm>
           <a:prstGeom prst="straightConnector1">
             <a:avLst/>
@@ -2078,40 +1930,6 @@
           </a:fontRef>
         </p:style>
       </p:cxnSp>
-      <p:sp>
-        <p:nvSpPr>
-          <p:cNvPr id="55" name="Rectangle 54"/>
-          <p:cNvSpPr/>
-          <p:nvPr/>
-        </p:nvSpPr>
-        <p:spPr>
-          <a:xfrm>
-            <a:off x="2441196" y="4660589"/>
-            <a:ext cx="822391" cy="461665"/>
-          </a:xfrm>
-          <a:prstGeom prst="rect">
-            <a:avLst/>
-          </a:prstGeom>
-        </p:spPr>
-        <p:txBody>
-          <a:bodyPr wrap="square">
-            <a:spAutoFit/>
-          </a:bodyPr>
-          <a:lstStyle/>
-          <a:p>
-            <a:pPr algn="ctr"/>
-            <a:r>
-              <a:rPr lang="en-US" sz="1200" b="1" dirty="0"/>
-              <a:t>Network </a:t>
-            </a:r>
-            <a:r>
-              <a:rPr lang="en-US" sz="1200" b="1" dirty="0" err="1" smtClean="0"/>
-              <a:t>Config</a:t>
-            </a:r>
-            <a:endParaRPr lang="en-US" sz="1200" b="1" dirty="0"/>
-          </a:p>
-        </p:txBody>
-      </p:sp>
       <p:cxnSp>
         <p:nvCxnSpPr>
           <p:cNvPr id="57" name="Straight Arrow Connector 56"/>
@@ -2509,7 +2327,7 @@
         </p:nvSpPr>
         <p:spPr>
           <a:xfrm>
-            <a:off x="1325972" y="4080662"/>
+            <a:off x="1144320" y="4304580"/>
             <a:ext cx="410595" cy="461665"/>
           </a:xfrm>
           <a:prstGeom prst="rect">
@@ -2538,13 +2356,13 @@
       </p:sp>
       <p:sp>
         <p:nvSpPr>
-          <p:cNvPr id="84" name="Rectangle 83"/>
+          <p:cNvPr id="85" name="Rectangle 84"/>
           <p:cNvSpPr/>
           <p:nvPr/>
         </p:nvSpPr>
         <p:spPr>
           <a:xfrm>
-            <a:off x="2080241" y="4176945"/>
+            <a:off x="3354739" y="4176945"/>
             <a:ext cx="410595" cy="461665"/>
           </a:xfrm>
           <a:prstGeom prst="rect">
@@ -2573,13 +2391,13 @@
       </p:sp>
       <p:sp>
         <p:nvSpPr>
-          <p:cNvPr id="85" name="Rectangle 84"/>
+          <p:cNvPr id="86" name="Rectangle 85"/>
           <p:cNvSpPr/>
           <p:nvPr/>
         </p:nvSpPr>
         <p:spPr>
           <a:xfrm>
-            <a:off x="3354739" y="4176945"/>
+            <a:off x="4404243" y="3971091"/>
             <a:ext cx="410595" cy="461665"/>
           </a:xfrm>
           <a:prstGeom prst="rect">
@@ -2608,14 +2426,14 @@
       </p:sp>
       <p:sp>
         <p:nvSpPr>
-          <p:cNvPr id="86" name="Rectangle 85"/>
+          <p:cNvPr id="89" name="Rectangle 88"/>
           <p:cNvSpPr/>
           <p:nvPr/>
         </p:nvSpPr>
         <p:spPr>
           <a:xfrm>
-            <a:off x="4404243" y="3971091"/>
-            <a:ext cx="410595" cy="461665"/>
+            <a:off x="5537594" y="4066401"/>
+            <a:ext cx="1015606" cy="276999"/>
           </a:xfrm>
           <a:prstGeom prst="rect">
             <a:avLst/>
@@ -2629,13 +2447,7 @@
           <a:p>
             <a:r>
               <a:rPr lang="en-US" sz="1200" b="1" dirty="0" smtClean="0"/>
-              <a:t>(1) </a:t>
-            </a:r>
-          </a:p>
-          <a:p>
-            <a:r>
-              <a:rPr lang="en-US" sz="1200" b="1" dirty="0" smtClean="0"/>
-              <a:t>(3)</a:t>
+              <a:t>(1), (2), (3)</a:t>
             </a:r>
             <a:endParaRPr lang="en-US" sz="1200" b="1" dirty="0"/>
           </a:p>
@@ -2643,14 +2455,14 @@
       </p:sp>
       <p:sp>
         <p:nvSpPr>
-          <p:cNvPr id="89" name="Rectangle 88"/>
+          <p:cNvPr id="90" name="Rectangle 89"/>
           <p:cNvSpPr/>
           <p:nvPr/>
         </p:nvSpPr>
         <p:spPr>
           <a:xfrm>
-            <a:off x="5537594" y="4066401"/>
-            <a:ext cx="1015606" cy="276999"/>
+            <a:off x="7361805" y="4078069"/>
+            <a:ext cx="410595" cy="646331"/>
           </a:xfrm>
           <a:prstGeom prst="rect">
             <a:avLst/>
@@ -2664,62 +2476,13 @@
           <a:p>
             <a:r>
               <a:rPr lang="en-US" sz="1200" b="1" dirty="0" smtClean="0"/>
-              <a:t>(1</a:t>
-            </a:r>
+              <a:t>(1) </a:t>
+            </a:r>
+          </a:p>
+          <a:p>
             <a:r>
               <a:rPr lang="en-US" sz="1200" b="1" dirty="0" smtClean="0"/>
-              <a:t>), (</a:t>
-            </a:r>
-            <a:r>
-              <a:rPr lang="en-US" sz="1200" b="1" dirty="0" smtClean="0"/>
-              <a:t>2</a:t>
-            </a:r>
-            <a:r>
-              <a:rPr lang="en-US" sz="1200" b="1" dirty="0" smtClean="0"/>
-              <a:t>), </a:t>
-            </a:r>
-            <a:r>
-              <a:rPr lang="en-US" sz="1200" b="1" dirty="0" smtClean="0"/>
-              <a:t>(3)</a:t>
-            </a:r>
-            <a:endParaRPr lang="en-US" sz="1200" b="1" dirty="0"/>
-          </a:p>
-        </p:txBody>
-      </p:sp>
-      <p:sp>
-        <p:nvSpPr>
-          <p:cNvPr id="90" name="Rectangle 89"/>
-          <p:cNvSpPr/>
-          <p:nvPr/>
-        </p:nvSpPr>
-        <p:spPr>
-          <a:xfrm>
-            <a:off x="7361805" y="4078069"/>
-            <a:ext cx="410595" cy="646331"/>
-          </a:xfrm>
-          <a:prstGeom prst="rect">
-            <a:avLst/>
-          </a:prstGeom>
-        </p:spPr>
-        <p:txBody>
-          <a:bodyPr wrap="square">
-            <a:spAutoFit/>
-          </a:bodyPr>
-          <a:lstStyle/>
-          <a:p>
-            <a:r>
-              <a:rPr lang="en-US" sz="1200" b="1" dirty="0" smtClean="0"/>
-              <a:t>(1) </a:t>
-            </a:r>
-          </a:p>
-          <a:p>
-            <a:r>
-              <a:rPr lang="en-US" sz="1200" b="1" dirty="0" smtClean="0"/>
-              <a:t>(2</a:t>
-            </a:r>
-            <a:r>
-              <a:rPr lang="en-US" sz="1200" b="1" dirty="0" smtClean="0"/>
-              <a:t>)</a:t>
+              <a:t>(2)</a:t>
             </a:r>
           </a:p>
           <a:p>

</xml_diff>

<commit_message>
Update use cases, requirements, etc JIRA: COPPER-3
Change-Id: I9cccac8afb95e8d08e0e8aeef0934f24c59a40d7
Signed-off-by: blsaws <bs3131@att.com>
</commit_message>
<xml_diff>
--- a/design_docs/images/policy_architecture.pptx
+++ b/design_docs/images/policy_architecture.pptx
@@ -208,7 +208,7 @@
           <a:p>
             <a:fld id="{CBF909A2-FA5B-469B-B268-8913338CE6C4}" type="datetimeFigureOut">
               <a:rPr lang="en-US" smtClean="0"/>
-              <a:t>7/31/2015</a:t>
+              <a:t>8/12/2015</a:t>
             </a:fld>
             <a:endParaRPr lang="en-US"/>
           </a:p>
@@ -1140,8 +1140,9 @@
             <a:pPr algn="ctr"/>
             <a:r>
               <a:rPr lang="en-US" dirty="0" smtClean="0"/>
-              <a:t>Controller</a:t>
-            </a:r>
+              <a:t>Global Controller</a:t>
+            </a:r>
+            <a:endParaRPr lang="en-US" dirty="0" smtClean="0"/>
           </a:p>
           <a:p>
             <a:pPr marL="113607" indent="-113607">

</xml_diff>